<commit_message>
Reinforced tests with more universal (and shorter) code, added method to extract every Rotation and every GridDirection at once. Added possibility for random value of Rotation and GridDirection.
</commit_message>
<xml_diff>
--- a/src/presentation/Codingwarriors.pptx
+++ b/src/presentation/Codingwarriors.pptx
@@ -3398,6 +3398,12 @@
             </a:r>
             <a:endParaRPr lang="nb-NO" dirty="0"/>
           </a:p>
+          <a:p>
+            <a:r>
+              <a:rPr lang="nb-NO" dirty="0"/>
+              <a:t>(Gruppe 7 – Grønt lag)</a:t>
+            </a:r>
+          </a:p>
         </p:txBody>
       </p:sp>
     </p:spTree>
@@ -3612,6 +3618,14 @@
               <a:rPr lang="nb-NO" dirty="0" err="1"/>
               <a:t>Projectboard</a:t>
             </a:r>
+            <a:r>
+              <a:rPr lang="nb-NO" dirty="0"/>
+              <a:t>, </a:t>
+            </a:r>
+            <a:r>
+              <a:rPr lang="nb-NO" dirty="0" err="1"/>
+              <a:t>Github</a:t>
+            </a:r>
             <a:endParaRPr lang="nb-NO" dirty="0"/>
           </a:p>
           <a:p>
@@ -3648,7 +3662,7 @@
             </a:r>
             <a:r>
               <a:rPr lang="nb-NO" dirty="0"/>
-              <a:t>: Planlegging av arbeid, arbeidet deles i oppgaver og gruppemedlemmene tok de oppgavene som passet best.</a:t>
+              <a:t>: Planlegging av arbeid, arbeidet deles i oppgaver og gruppemedlemmene tok de oppgavene som passet best. Samkjøring og retrospektivt perspektiv etterpå.</a:t>
             </a:r>
           </a:p>
         </p:txBody>
@@ -4006,7 +4020,7 @@
         <p:spPr/>
         <p:txBody>
           <a:bodyPr>
-            <a:normAutofit fontScale="85000" lnSpcReduction="20000"/>
+            <a:normAutofit fontScale="77500" lnSpcReduction="20000"/>
           </a:bodyPr>
           <a:lstStyle/>
           <a:p>
@@ -4085,6 +4099,17 @@
               <a:rPr lang="nb-NO" dirty="0"/>
               <a:t>NPC?</a:t>
             </a:r>
+          </a:p>
+          <a:p>
+            <a:r>
+              <a:rPr lang="nb-NO" dirty="0"/>
+              <a:t>Støtte </a:t>
+            </a:r>
+            <a:r>
+              <a:rPr lang="nb-NO" dirty="0" err="1"/>
+              <a:t>fullskjermmodus</a:t>
+            </a:r>
+            <a:endParaRPr lang="nb-NO" dirty="0"/>
           </a:p>
         </p:txBody>
       </p:sp>

</xml_diff>